<commit_message>
add who is presentating which part
</commit_message>
<xml_diff>
--- a/Zwischen-Präsentation.pptx
+++ b/Zwischen-Präsentation.pptx
@@ -125,6 +125,44 @@
     </a:lvl9pPr>
   </p:defaultTextStyle>
   <p:extLst>
+    <p:ext uri="{521415D9-36F7-43E2-AB2F-B90AF26B5E84}">
+      <p14:sectionLst xmlns:p14="http://schemas.microsoft.com/office/powerpoint/2010/main">
+        <p14:section name="Aleks" id="{5443F5D6-AE6C-4045-B9E0-609E5B05EF86}">
+          <p14:sldIdLst>
+            <p14:sldId id="256"/>
+            <p14:sldId id="261"/>
+          </p14:sldIdLst>
+        </p14:section>
+        <p14:section name="Wladi" id="{935711D7-AAAC-4225-AB70-CCB4CD4BBDE8}">
+          <p14:sldIdLst>
+            <p14:sldId id="257"/>
+            <p14:sldId id="307"/>
+            <p14:sldId id="346"/>
+            <p14:sldId id="348"/>
+            <p14:sldId id="349"/>
+            <p14:sldId id="350"/>
+            <p14:sldId id="351"/>
+            <p14:sldId id="352"/>
+          </p14:sldIdLst>
+        </p14:section>
+        <p14:section name="Wladi" id="{922FF0E3-59F9-41B6-A727-0187D3E5B5CD}">
+          <p14:sldIdLst>
+            <p14:sldId id="341"/>
+            <p14:sldId id="353"/>
+          </p14:sldIdLst>
+        </p14:section>
+        <p14:section name="Aleks" id="{C669B1B9-2EC6-4890-BFD5-97CCD8B01A93}">
+          <p14:sldIdLst>
+            <p14:sldId id="343"/>
+            <p14:sldId id="354"/>
+            <p14:sldId id="345"/>
+            <p14:sldId id="355"/>
+            <p14:sldId id="356"/>
+            <p14:sldId id="268"/>
+          </p14:sldIdLst>
+        </p14:section>
+      </p14:sectionLst>
+    </p:ext>
     <p:ext uri="{EFAFB233-063F-42B5-8137-9DF3F51BA10A}">
       <p15:sldGuideLst xmlns:p15="http://schemas.microsoft.com/office/powerpoint/2012/main"/>
     </p:ext>
@@ -8472,6 +8510,22 @@
             <ac:picMk id="26" creationId="{63F26976-E84B-4CC2-C108-6906D7AC50BF}"/>
           </ac:picMkLst>
         </pc:picChg>
+      </pc:sldChg>
+    </pc:docChg>
+  </pc:docChgLst>
+  <pc:docChgLst>
+    <pc:chgData name="Aleksandr Maj" userId="S::aleksandr.maj@officehn.onmicrosoft.com::529cb5f1-3fc1-41b2-a220-617302d72847" providerId="AD" clId="Web-{F7D89F8E-015E-566A-91FA-DF3EEAFC5B9C}"/>
+    <pc:docChg chg="modSld">
+      <pc:chgData name="Aleksandr Maj" userId="S::aleksandr.maj@officehn.onmicrosoft.com::529cb5f1-3fc1-41b2-a220-617302d72847" providerId="AD" clId="Web-{F7D89F8E-015E-566A-91FA-DF3EEAFC5B9C}" dt="2023-12-06T07:56:49.810" v="0"/>
+      <pc:docMkLst>
+        <pc:docMk/>
+      </pc:docMkLst>
+      <pc:sldChg chg="mod modShow">
+        <pc:chgData name="Aleksandr Maj" userId="S::aleksandr.maj@officehn.onmicrosoft.com::529cb5f1-3fc1-41b2-a220-617302d72847" providerId="AD" clId="Web-{F7D89F8E-015E-566A-91FA-DF3EEAFC5B9C}" dt="2023-12-06T07:56:49.810" v="0"/>
+        <pc:sldMkLst>
+          <pc:docMk/>
+          <pc:sldMk cId="3376440628" sldId="339"/>
+        </pc:sldMkLst>
       </pc:sldChg>
     </pc:docChg>
   </pc:docChgLst>
@@ -12342,22 +12396,6 @@
       </pc:sldChg>
     </pc:docChg>
   </pc:docChgLst>
-  <pc:docChgLst>
-    <pc:chgData name="Aleksandr Maj" userId="S::aleksandr.maj@officehn.onmicrosoft.com::529cb5f1-3fc1-41b2-a220-617302d72847" providerId="AD" clId="Web-{F7D89F8E-015E-566A-91FA-DF3EEAFC5B9C}"/>
-    <pc:docChg chg="modSld">
-      <pc:chgData name="Aleksandr Maj" userId="S::aleksandr.maj@officehn.onmicrosoft.com::529cb5f1-3fc1-41b2-a220-617302d72847" providerId="AD" clId="Web-{F7D89F8E-015E-566A-91FA-DF3EEAFC5B9C}" dt="2023-12-06T07:56:49.810" v="0"/>
-      <pc:docMkLst>
-        <pc:docMk/>
-      </pc:docMkLst>
-      <pc:sldChg chg="mod modShow">
-        <pc:chgData name="Aleksandr Maj" userId="S::aleksandr.maj@officehn.onmicrosoft.com::529cb5f1-3fc1-41b2-a220-617302d72847" providerId="AD" clId="Web-{F7D89F8E-015E-566A-91FA-DF3EEAFC5B9C}" dt="2023-12-06T07:56:49.810" v="0"/>
-        <pc:sldMkLst>
-          <pc:docMk/>
-          <pc:sldMk cId="3376440628" sldId="339"/>
-        </pc:sldMkLst>
-      </pc:sldChg>
-    </pc:docChg>
-  </pc:docChgLst>
 </pc:chgInfo>
 </file>
 
@@ -12443,7 +12481,7 @@
           <a:p>
             <a:fld id="{290CDF47-B23A-4CC5-A56C-0A86BE245ADB}" type="datetimeFigureOut">
               <a:rPr lang="de-DE" smtClean="0"/>
-              <a:t>11.06.2024</a:t>
+              <a:t>12.06.2024</a:t>
             </a:fld>
             <a:endParaRPr lang="de-DE"/>
           </a:p>
@@ -12754,6 +12792,90 @@
           <a:bodyPr/>
           <a:lstStyle/>
           <a:p>
+            <a:endParaRPr lang="de-DE" dirty="0"/>
+          </a:p>
+        </p:txBody>
+      </p:sp>
+      <p:sp>
+        <p:nvSpPr>
+          <p:cNvPr id="4" name="Foliennummernplatzhalter 3"/>
+          <p:cNvSpPr>
+            <a:spLocks noGrp="1"/>
+          </p:cNvSpPr>
+          <p:nvPr>
+            <p:ph type="sldNum" sz="quarter" idx="5"/>
+          </p:nvPr>
+        </p:nvSpPr>
+        <p:spPr/>
+        <p:txBody>
+          <a:bodyPr/>
+          <a:lstStyle/>
+          <a:p>
+            <a:fld id="{7019B76D-A09E-4559-8E19-D159EA5CA74D}" type="slidenum">
+              <a:rPr lang="de-DE" smtClean="0"/>
+              <a:t>1</a:t>
+            </a:fld>
+            <a:endParaRPr lang="de-DE"/>
+          </a:p>
+        </p:txBody>
+      </p:sp>
+    </p:spTree>
+    <p:extLst>
+      <p:ext uri="{BB962C8B-B14F-4D97-AF65-F5344CB8AC3E}">
+        <p14:creationId xmlns:p14="http://schemas.microsoft.com/office/powerpoint/2010/main" val="3182785232"/>
+      </p:ext>
+    </p:extLst>
+  </p:cSld>
+  <p:clrMapOvr>
+    <a:masterClrMapping/>
+  </p:clrMapOvr>
+</p:notes>
+</file>
+
+<file path=ppt/notesSlides/notesSlide10.xml><?xml version="1.0" encoding="utf-8"?>
+<p:notes xmlns:a="http://schemas.openxmlformats.org/drawingml/2006/main" xmlns:r="http://schemas.openxmlformats.org/officeDocument/2006/relationships" xmlns:p="http://schemas.openxmlformats.org/presentationml/2006/main">
+  <p:cSld>
+    <p:spTree>
+      <p:nvGrpSpPr>
+        <p:cNvPr id="1" name=""/>
+        <p:cNvGrpSpPr/>
+        <p:nvPr/>
+      </p:nvGrpSpPr>
+      <p:grpSpPr>
+        <a:xfrm>
+          <a:off x="0" y="0"/>
+          <a:ext cx="0" cy="0"/>
+          <a:chOff x="0" y="0"/>
+          <a:chExt cx="0" cy="0"/>
+        </a:xfrm>
+      </p:grpSpPr>
+      <p:sp>
+        <p:nvSpPr>
+          <p:cNvPr id="2" name="Folienbildplatzhalter 1"/>
+          <p:cNvSpPr>
+            <a:spLocks noGrp="1" noRot="1" noChangeAspect="1"/>
+          </p:cNvSpPr>
+          <p:nvPr>
+            <p:ph type="sldImg"/>
+          </p:nvPr>
+        </p:nvSpPr>
+        <p:spPr/>
+      </p:sp>
+      <p:sp>
+        <p:nvSpPr>
+          <p:cNvPr id="3" name="Notizenplatzhalter 2"/>
+          <p:cNvSpPr>
+            <a:spLocks noGrp="1"/>
+          </p:cNvSpPr>
+          <p:nvPr>
+            <p:ph type="body" idx="1"/>
+          </p:nvPr>
+        </p:nvSpPr>
+        <p:spPr/>
+        <p:txBody>
+          <a:bodyPr/>
+          <a:lstStyle/>
+          <a:p>
             <a:r>
               <a:rPr lang="de-DE" dirty="0"/>
               <a:t>Folie zu erklären was machen Walzen überhaupt? Was ist das?</a:t>
@@ -12778,7 +12900,7 @@
           <a:p>
             <a:fld id="{7019B76D-A09E-4559-8E19-D159EA5CA74D}" type="slidenum">
               <a:rPr lang="de-DE" smtClean="0"/>
-              <a:t>3</a:t>
+              <a:t>14</a:t>
             </a:fld>
             <a:endParaRPr lang="de-DE"/>
           </a:p>
@@ -12787,7 +12909,7 @@
     </p:spTree>
     <p:extLst>
       <p:ext uri="{BB962C8B-B14F-4D97-AF65-F5344CB8AC3E}">
-        <p14:creationId xmlns:p14="http://schemas.microsoft.com/office/powerpoint/2010/main" val="3898610580"/>
+        <p14:creationId xmlns:p14="http://schemas.microsoft.com/office/powerpoint/2010/main" val="3582211699"/>
       </p:ext>
     </p:extLst>
   </p:cSld>
@@ -12797,7 +12919,7 @@
 </p:notes>
 </file>
 
-<file path=ppt/notesSlides/notesSlide10.xml><?xml version="1.0" encoding="utf-8"?>
+<file path=ppt/notesSlides/notesSlide11.xml><?xml version="1.0" encoding="utf-8"?>
 <p:notes xmlns:a="http://schemas.openxmlformats.org/drawingml/2006/main" xmlns:r="http://schemas.openxmlformats.org/officeDocument/2006/relationships" xmlns:p="http://schemas.openxmlformats.org/presentationml/2006/main">
   <p:cSld>
     <p:spTree>
@@ -12884,7 +13006,7 @@
 </p:notes>
 </file>
 
-<file path=ppt/notesSlides/notesSlide11.xml><?xml version="1.0" encoding="utf-8"?>
+<file path=ppt/notesSlides/notesSlide12.xml><?xml version="1.0" encoding="utf-8"?>
 <p:notes xmlns:a="http://schemas.openxmlformats.org/drawingml/2006/main" xmlns:r="http://schemas.openxmlformats.org/officeDocument/2006/relationships" xmlns:p="http://schemas.openxmlformats.org/presentationml/2006/main">
   <p:cSld>
     <p:spTree>
@@ -12971,7 +13093,7 @@
 </p:notes>
 </file>
 
-<file path=ppt/notesSlides/notesSlide12.xml><?xml version="1.0" encoding="utf-8"?>
+<file path=ppt/notesSlides/notesSlide13.xml><?xml version="1.0" encoding="utf-8"?>
 <p:notes xmlns:a="http://schemas.openxmlformats.org/drawingml/2006/main" xmlns:r="http://schemas.openxmlformats.org/officeDocument/2006/relationships" xmlns:p="http://schemas.openxmlformats.org/presentationml/2006/main">
   <p:cSld>
     <p:spTree>
@@ -13126,6 +13248,93 @@
           <a:p>
             <a:fld id="{7019B76D-A09E-4559-8E19-D159EA5CA74D}" type="slidenum">
               <a:rPr lang="de-DE" smtClean="0"/>
+              <a:t>3</a:t>
+            </a:fld>
+            <a:endParaRPr lang="de-DE"/>
+          </a:p>
+        </p:txBody>
+      </p:sp>
+    </p:spTree>
+    <p:extLst>
+      <p:ext uri="{BB962C8B-B14F-4D97-AF65-F5344CB8AC3E}">
+        <p14:creationId xmlns:p14="http://schemas.microsoft.com/office/powerpoint/2010/main" val="3898610580"/>
+      </p:ext>
+    </p:extLst>
+  </p:cSld>
+  <p:clrMapOvr>
+    <a:masterClrMapping/>
+  </p:clrMapOvr>
+</p:notes>
+</file>
+
+<file path=ppt/notesSlides/notesSlide3.xml><?xml version="1.0" encoding="utf-8"?>
+<p:notes xmlns:a="http://schemas.openxmlformats.org/drawingml/2006/main" xmlns:r="http://schemas.openxmlformats.org/officeDocument/2006/relationships" xmlns:p="http://schemas.openxmlformats.org/presentationml/2006/main">
+  <p:cSld>
+    <p:spTree>
+      <p:nvGrpSpPr>
+        <p:cNvPr id="1" name=""/>
+        <p:cNvGrpSpPr/>
+        <p:nvPr/>
+      </p:nvGrpSpPr>
+      <p:grpSpPr>
+        <a:xfrm>
+          <a:off x="0" y="0"/>
+          <a:ext cx="0" cy="0"/>
+          <a:chOff x="0" y="0"/>
+          <a:chExt cx="0" cy="0"/>
+        </a:xfrm>
+      </p:grpSpPr>
+      <p:sp>
+        <p:nvSpPr>
+          <p:cNvPr id="2" name="Folienbildplatzhalter 1"/>
+          <p:cNvSpPr>
+            <a:spLocks noGrp="1" noRot="1" noChangeAspect="1"/>
+          </p:cNvSpPr>
+          <p:nvPr>
+            <p:ph type="sldImg"/>
+          </p:nvPr>
+        </p:nvSpPr>
+        <p:spPr/>
+      </p:sp>
+      <p:sp>
+        <p:nvSpPr>
+          <p:cNvPr id="3" name="Notizenplatzhalter 2"/>
+          <p:cNvSpPr>
+            <a:spLocks noGrp="1"/>
+          </p:cNvSpPr>
+          <p:nvPr>
+            <p:ph type="body" idx="1"/>
+          </p:nvPr>
+        </p:nvSpPr>
+        <p:spPr/>
+        <p:txBody>
+          <a:bodyPr/>
+          <a:lstStyle/>
+          <a:p>
+            <a:r>
+              <a:rPr lang="de-DE" dirty="0"/>
+              <a:t>Folie zu erklären was machen Walzen überhaupt? Was ist das?</a:t>
+            </a:r>
+          </a:p>
+        </p:txBody>
+      </p:sp>
+      <p:sp>
+        <p:nvSpPr>
+          <p:cNvPr id="4" name="Foliennummernplatzhalter 3"/>
+          <p:cNvSpPr>
+            <a:spLocks noGrp="1"/>
+          </p:cNvSpPr>
+          <p:nvPr>
+            <p:ph type="sldNum" sz="quarter" idx="5"/>
+          </p:nvPr>
+        </p:nvSpPr>
+        <p:spPr/>
+        <p:txBody>
+          <a:bodyPr/>
+          <a:lstStyle/>
+          <a:p>
+            <a:fld id="{7019B76D-A09E-4559-8E19-D159EA5CA74D}" type="slidenum">
+              <a:rPr lang="de-DE" smtClean="0"/>
               <a:t>5</a:t>
             </a:fld>
             <a:endParaRPr lang="de-DE"/>
@@ -13145,7 +13354,7 @@
 </p:notes>
 </file>
 
-<file path=ppt/notesSlides/notesSlide3.xml><?xml version="1.0" encoding="utf-8"?>
+<file path=ppt/notesSlides/notesSlide4.xml><?xml version="1.0" encoding="utf-8"?>
 <p:notes xmlns:a="http://schemas.openxmlformats.org/drawingml/2006/main" xmlns:r="http://schemas.openxmlformats.org/officeDocument/2006/relationships" xmlns:p="http://schemas.openxmlformats.org/presentationml/2006/main">
   <p:cSld>
     <p:spTree>
@@ -13232,7 +13441,7 @@
 </p:notes>
 </file>
 
-<file path=ppt/notesSlides/notesSlide4.xml><?xml version="1.0" encoding="utf-8"?>
+<file path=ppt/notesSlides/notesSlide5.xml><?xml version="1.0" encoding="utf-8"?>
 <p:notes xmlns:a="http://schemas.openxmlformats.org/drawingml/2006/main" xmlns:r="http://schemas.openxmlformats.org/officeDocument/2006/relationships" xmlns:p="http://schemas.openxmlformats.org/presentationml/2006/main">
   <p:cSld>
     <p:spTree>
@@ -13319,7 +13528,7 @@
 </p:notes>
 </file>
 
-<file path=ppt/notesSlides/notesSlide5.xml><?xml version="1.0" encoding="utf-8"?>
+<file path=ppt/notesSlides/notesSlide6.xml><?xml version="1.0" encoding="utf-8"?>
 <p:notes xmlns:a="http://schemas.openxmlformats.org/drawingml/2006/main" xmlns:r="http://schemas.openxmlformats.org/officeDocument/2006/relationships" xmlns:p="http://schemas.openxmlformats.org/presentationml/2006/main">
   <p:cSld>
     <p:spTree>
@@ -13406,7 +13615,7 @@
 </p:notes>
 </file>
 
-<file path=ppt/notesSlides/notesSlide6.xml><?xml version="1.0" encoding="utf-8"?>
+<file path=ppt/notesSlides/notesSlide7.xml><?xml version="1.0" encoding="utf-8"?>
 <p:notes xmlns:a="http://schemas.openxmlformats.org/drawingml/2006/main" xmlns:r="http://schemas.openxmlformats.org/officeDocument/2006/relationships" xmlns:p="http://schemas.openxmlformats.org/presentationml/2006/main">
   <p:cSld>
     <p:spTree>
@@ -13493,7 +13702,7 @@
 </p:notes>
 </file>
 
-<file path=ppt/notesSlides/notesSlide7.xml><?xml version="1.0" encoding="utf-8"?>
+<file path=ppt/notesSlides/notesSlide8.xml><?xml version="1.0" encoding="utf-8"?>
 <p:notes xmlns:a="http://schemas.openxmlformats.org/drawingml/2006/main" xmlns:r="http://schemas.openxmlformats.org/officeDocument/2006/relationships" xmlns:p="http://schemas.openxmlformats.org/presentationml/2006/main">
   <p:cSld>
     <p:spTree>
@@ -13580,7 +13789,7 @@
 </p:notes>
 </file>
 
-<file path=ppt/notesSlides/notesSlide8.xml><?xml version="1.0" encoding="utf-8"?>
+<file path=ppt/notesSlides/notesSlide9.xml><?xml version="1.0" encoding="utf-8"?>
 <p:notes xmlns:a="http://schemas.openxmlformats.org/drawingml/2006/main" xmlns:r="http://schemas.openxmlformats.org/officeDocument/2006/relationships" xmlns:p="http://schemas.openxmlformats.org/presentationml/2006/main">
   <p:cSld>
     <p:spTree>
@@ -13658,93 +13867,6 @@
     <p:extLst>
       <p:ext uri="{BB962C8B-B14F-4D97-AF65-F5344CB8AC3E}">
         <p14:creationId xmlns:p14="http://schemas.microsoft.com/office/powerpoint/2010/main" val="2751650803"/>
-      </p:ext>
-    </p:extLst>
-  </p:cSld>
-  <p:clrMapOvr>
-    <a:masterClrMapping/>
-  </p:clrMapOvr>
-</p:notes>
-</file>
-
-<file path=ppt/notesSlides/notesSlide9.xml><?xml version="1.0" encoding="utf-8"?>
-<p:notes xmlns:a="http://schemas.openxmlformats.org/drawingml/2006/main" xmlns:r="http://schemas.openxmlformats.org/officeDocument/2006/relationships" xmlns:p="http://schemas.openxmlformats.org/presentationml/2006/main">
-  <p:cSld>
-    <p:spTree>
-      <p:nvGrpSpPr>
-        <p:cNvPr id="1" name=""/>
-        <p:cNvGrpSpPr/>
-        <p:nvPr/>
-      </p:nvGrpSpPr>
-      <p:grpSpPr>
-        <a:xfrm>
-          <a:off x="0" y="0"/>
-          <a:ext cx="0" cy="0"/>
-          <a:chOff x="0" y="0"/>
-          <a:chExt cx="0" cy="0"/>
-        </a:xfrm>
-      </p:grpSpPr>
-      <p:sp>
-        <p:nvSpPr>
-          <p:cNvPr id="2" name="Folienbildplatzhalter 1"/>
-          <p:cNvSpPr>
-            <a:spLocks noGrp="1" noRot="1" noChangeAspect="1"/>
-          </p:cNvSpPr>
-          <p:nvPr>
-            <p:ph type="sldImg"/>
-          </p:nvPr>
-        </p:nvSpPr>
-        <p:spPr/>
-      </p:sp>
-      <p:sp>
-        <p:nvSpPr>
-          <p:cNvPr id="3" name="Notizenplatzhalter 2"/>
-          <p:cNvSpPr>
-            <a:spLocks noGrp="1"/>
-          </p:cNvSpPr>
-          <p:nvPr>
-            <p:ph type="body" idx="1"/>
-          </p:nvPr>
-        </p:nvSpPr>
-        <p:spPr/>
-        <p:txBody>
-          <a:bodyPr/>
-          <a:lstStyle/>
-          <a:p>
-            <a:r>
-              <a:rPr lang="de-DE" dirty="0"/>
-              <a:t>Folie zu erklären was machen Walzen überhaupt? Was ist das?</a:t>
-            </a:r>
-          </a:p>
-        </p:txBody>
-      </p:sp>
-      <p:sp>
-        <p:nvSpPr>
-          <p:cNvPr id="4" name="Foliennummernplatzhalter 3"/>
-          <p:cNvSpPr>
-            <a:spLocks noGrp="1"/>
-          </p:cNvSpPr>
-          <p:nvPr>
-            <p:ph type="sldNum" sz="quarter" idx="5"/>
-          </p:nvPr>
-        </p:nvSpPr>
-        <p:spPr/>
-        <p:txBody>
-          <a:bodyPr/>
-          <a:lstStyle/>
-          <a:p>
-            <a:fld id="{7019B76D-A09E-4559-8E19-D159EA5CA74D}" type="slidenum">
-              <a:rPr lang="de-DE" smtClean="0"/>
-              <a:t>14</a:t>
-            </a:fld>
-            <a:endParaRPr lang="de-DE"/>
-          </a:p>
-        </p:txBody>
-      </p:sp>
-    </p:spTree>
-    <p:extLst>
-      <p:ext uri="{BB962C8B-B14F-4D97-AF65-F5344CB8AC3E}">
-        <p14:creationId xmlns:p14="http://schemas.microsoft.com/office/powerpoint/2010/main" val="3582211699"/>
       </p:ext>
     </p:extLst>
   </p:cSld>
@@ -13901,7 +14023,7 @@
           <a:p>
             <a:fld id="{CE800001-F7EE-47B6-A215-BCA6054410BA}" type="datetimeFigureOut">
               <a:rPr lang="de-DE" smtClean="0"/>
-              <a:t>11.06.2024</a:t>
+              <a:t>12.06.2024</a:t>
             </a:fld>
             <a:endParaRPr lang="de-DE"/>
           </a:p>
@@ -14099,7 +14221,7 @@
           <a:p>
             <a:fld id="{CE800001-F7EE-47B6-A215-BCA6054410BA}" type="datetimeFigureOut">
               <a:rPr lang="de-DE" smtClean="0"/>
-              <a:t>11.06.2024</a:t>
+              <a:t>12.06.2024</a:t>
             </a:fld>
             <a:endParaRPr lang="de-DE"/>
           </a:p>
@@ -14307,7 +14429,7 @@
           <a:p>
             <a:fld id="{CE800001-F7EE-47B6-A215-BCA6054410BA}" type="datetimeFigureOut">
               <a:rPr lang="de-DE" smtClean="0"/>
-              <a:t>11.06.2024</a:t>
+              <a:t>12.06.2024</a:t>
             </a:fld>
             <a:endParaRPr lang="de-DE"/>
           </a:p>
@@ -14505,7 +14627,7 @@
           <a:p>
             <a:fld id="{CE800001-F7EE-47B6-A215-BCA6054410BA}" type="datetimeFigureOut">
               <a:rPr lang="de-DE" smtClean="0"/>
-              <a:t>11.06.2024</a:t>
+              <a:t>12.06.2024</a:t>
             </a:fld>
             <a:endParaRPr lang="de-DE"/>
           </a:p>
@@ -14780,7 +14902,7 @@
           <a:p>
             <a:fld id="{CE800001-F7EE-47B6-A215-BCA6054410BA}" type="datetimeFigureOut">
               <a:rPr lang="de-DE" smtClean="0"/>
-              <a:t>11.06.2024</a:t>
+              <a:t>12.06.2024</a:t>
             </a:fld>
             <a:endParaRPr lang="de-DE"/>
           </a:p>
@@ -15045,7 +15167,7 @@
           <a:p>
             <a:fld id="{CE800001-F7EE-47B6-A215-BCA6054410BA}" type="datetimeFigureOut">
               <a:rPr lang="de-DE" smtClean="0"/>
-              <a:t>11.06.2024</a:t>
+              <a:t>12.06.2024</a:t>
             </a:fld>
             <a:endParaRPr lang="de-DE"/>
           </a:p>
@@ -15457,7 +15579,7 @@
           <a:p>
             <a:fld id="{CE800001-F7EE-47B6-A215-BCA6054410BA}" type="datetimeFigureOut">
               <a:rPr lang="de-DE" smtClean="0"/>
-              <a:t>11.06.2024</a:t>
+              <a:t>12.06.2024</a:t>
             </a:fld>
             <a:endParaRPr lang="de-DE"/>
           </a:p>
@@ -15598,7 +15720,7 @@
           <a:p>
             <a:fld id="{CE800001-F7EE-47B6-A215-BCA6054410BA}" type="datetimeFigureOut">
               <a:rPr lang="de-DE" smtClean="0"/>
-              <a:t>11.06.2024</a:t>
+              <a:t>12.06.2024</a:t>
             </a:fld>
             <a:endParaRPr lang="de-DE"/>
           </a:p>
@@ -15711,7 +15833,7 @@
           <a:p>
             <a:fld id="{CE800001-F7EE-47B6-A215-BCA6054410BA}" type="datetimeFigureOut">
               <a:rPr lang="de-DE" smtClean="0"/>
-              <a:t>11.06.2024</a:t>
+              <a:t>12.06.2024</a:t>
             </a:fld>
             <a:endParaRPr lang="de-DE"/>
           </a:p>
@@ -16022,7 +16144,7 @@
           <a:p>
             <a:fld id="{CE800001-F7EE-47B6-A215-BCA6054410BA}" type="datetimeFigureOut">
               <a:rPr lang="de-DE" smtClean="0"/>
-              <a:t>11.06.2024</a:t>
+              <a:t>12.06.2024</a:t>
             </a:fld>
             <a:endParaRPr lang="de-DE"/>
           </a:p>
@@ -16310,7 +16432,7 @@
           <a:p>
             <a:fld id="{CE800001-F7EE-47B6-A215-BCA6054410BA}" type="datetimeFigureOut">
               <a:rPr lang="de-DE" smtClean="0"/>
-              <a:t>11.06.2024</a:t>
+              <a:t>12.06.2024</a:t>
             </a:fld>
             <a:endParaRPr lang="de-DE"/>
           </a:p>
@@ -16551,7 +16673,7 @@
           <a:p>
             <a:fld id="{CE800001-F7EE-47B6-A215-BCA6054410BA}" type="datetimeFigureOut">
               <a:rPr lang="de-DE" smtClean="0"/>
-              <a:t>11.06.2024</a:t>
+              <a:t>12.06.2024</a:t>
             </a:fld>
             <a:endParaRPr lang="de-DE"/>
           </a:p>
@@ -17187,7 +17309,7 @@
           <p:nvPr/>
         </p:nvPicPr>
         <p:blipFill>
-          <a:blip r:embed="rId2">
+          <a:blip r:embed="rId3">
             <a:lum bright="70000" contrast="-70000"/>
             <a:extLst>
               <a:ext uri="{28A0092B-C50C-407E-A947-70E740481C1C}">
@@ -18564,13 +18686,13 @@
   <p:clrMapOvr>
     <a:masterClrMapping/>
   </p:clrMapOvr>
-  <mc:AlternateContent xmlns:mc="http://schemas.openxmlformats.org/markup-compatibility/2006">
-    <mc:Choice xmlns:p159="http://schemas.microsoft.com/office/powerpoint/2015/09/main" Requires="p159">
+  <mc:AlternateContent xmlns:mc="http://schemas.openxmlformats.org/markup-compatibility/2006" xmlns:p159="http://schemas.microsoft.com/office/powerpoint/2015/09/main">
+    <mc:Choice Requires="p159">
       <p:transition xmlns:p14="http://schemas.microsoft.com/office/powerpoint/2010/main" spd="slow" p14:dur="2000">
         <p159:morph option="byObject"/>
       </p:transition>
     </mc:Choice>
-    <mc:Fallback>
+    <mc:Fallback xmlns="">
       <p:transition spd="slow">
         <p:fade/>
       </p:transition>
@@ -19289,13 +19411,13 @@
   <p:clrMapOvr>
     <a:masterClrMapping/>
   </p:clrMapOvr>
-  <mc:AlternateContent xmlns:mc="http://schemas.openxmlformats.org/markup-compatibility/2006">
-    <mc:Choice xmlns:p159="http://schemas.microsoft.com/office/powerpoint/2015/09/main" Requires="p159">
+  <mc:AlternateContent xmlns:mc="http://schemas.openxmlformats.org/markup-compatibility/2006" xmlns:p159="http://schemas.microsoft.com/office/powerpoint/2015/09/main">
+    <mc:Choice Requires="p159">
       <p:transition xmlns:p14="http://schemas.microsoft.com/office/powerpoint/2010/main" spd="slow" p14:dur="2000">
         <p159:morph option="byObject"/>
       </p:transition>
     </mc:Choice>
-    <mc:Fallback>
+    <mc:Fallback xmlns="">
       <p:transition spd="slow">
         <p:fade/>
       </p:transition>
@@ -19916,13 +20038,13 @@
   <p:clrMapOvr>
     <a:masterClrMapping/>
   </p:clrMapOvr>
-  <mc:AlternateContent xmlns:mc="http://schemas.openxmlformats.org/markup-compatibility/2006">
-    <mc:Choice xmlns:p159="http://schemas.microsoft.com/office/powerpoint/2015/09/main" Requires="p159">
+  <mc:AlternateContent xmlns:mc="http://schemas.openxmlformats.org/markup-compatibility/2006" xmlns:p159="http://schemas.microsoft.com/office/powerpoint/2015/09/main">
+    <mc:Choice Requires="p159">
       <p:transition xmlns:p14="http://schemas.microsoft.com/office/powerpoint/2010/main" spd="slow" p14:dur="2000">
         <p159:morph option="byObject"/>
       </p:transition>
     </mc:Choice>
-    <mc:Fallback>
+    <mc:Fallback xmlns="">
       <p:transition spd="slow">
         <p:fade/>
       </p:transition>
@@ -21132,13 +21254,13 @@
   <p:clrMapOvr>
     <a:masterClrMapping/>
   </p:clrMapOvr>
-  <mc:AlternateContent xmlns:mc="http://schemas.openxmlformats.org/markup-compatibility/2006">
-    <mc:Choice xmlns:p14="http://schemas.microsoft.com/office/powerpoint/2010/main" Requires="p14">
+  <mc:AlternateContent xmlns:mc="http://schemas.openxmlformats.org/markup-compatibility/2006" xmlns:p14="http://schemas.microsoft.com/office/powerpoint/2010/main">
+    <mc:Choice Requires="p14">
       <p:transition spd="med" p14:dur="700">
         <p:fade/>
       </p:transition>
     </mc:Choice>
-    <mc:Fallback>
+    <mc:Fallback xmlns="">
       <p:transition spd="med">
         <p:fade/>
       </p:transition>
@@ -21346,13 +21468,13 @@
   <p:clrMapOvr>
     <a:masterClrMapping/>
   </p:clrMapOvr>
-  <mc:AlternateContent xmlns:mc="http://schemas.openxmlformats.org/markup-compatibility/2006">
-    <mc:Choice xmlns:p14="http://schemas.microsoft.com/office/powerpoint/2010/main" Requires="p14">
+  <mc:AlternateContent xmlns:mc="http://schemas.openxmlformats.org/markup-compatibility/2006" xmlns:p14="http://schemas.microsoft.com/office/powerpoint/2010/main">
+    <mc:Choice Requires="p14">
       <p:transition spd="med" p14:dur="700">
         <p:fade/>
       </p:transition>
     </mc:Choice>
-    <mc:Fallback>
+    <mc:Fallback xmlns="">
       <p:transition spd="med">
         <p:fade/>
       </p:transition>
@@ -23617,13 +23739,13 @@
   <p:clrMapOvr>
     <a:masterClrMapping/>
   </p:clrMapOvr>
-  <mc:AlternateContent xmlns:mc="http://schemas.openxmlformats.org/markup-compatibility/2006">
-    <mc:Choice xmlns:p159="http://schemas.microsoft.com/office/powerpoint/2015/09/main" Requires="p159">
+  <mc:AlternateContent xmlns:mc="http://schemas.openxmlformats.org/markup-compatibility/2006" xmlns:p159="http://schemas.microsoft.com/office/powerpoint/2015/09/main">
+    <mc:Choice Requires="p159">
       <p:transition xmlns:p14="http://schemas.microsoft.com/office/powerpoint/2010/main" spd="slow" p14:dur="2000">
         <p159:morph option="byObject"/>
       </p:transition>
     </mc:Choice>
-    <mc:Fallback>
+    <mc:Fallback xmlns="">
       <p:transition spd="slow">
         <p:fade/>
       </p:transition>
@@ -24691,13 +24813,13 @@
   <p:clrMapOvr>
     <a:masterClrMapping/>
   </p:clrMapOvr>
-  <mc:AlternateContent xmlns:mc="http://schemas.openxmlformats.org/markup-compatibility/2006">
-    <mc:Choice xmlns:p159="http://schemas.microsoft.com/office/powerpoint/2015/09/main" Requires="p159">
+  <mc:AlternateContent xmlns:mc="http://schemas.openxmlformats.org/markup-compatibility/2006" xmlns:p159="http://schemas.microsoft.com/office/powerpoint/2015/09/main">
+    <mc:Choice Requires="p159">
       <p:transition xmlns:p14="http://schemas.microsoft.com/office/powerpoint/2010/main" spd="slow" p14:dur="2000">
         <p159:morph option="byObject"/>
       </p:transition>
     </mc:Choice>
-    <mc:Fallback>
+    <mc:Fallback xmlns="">
       <p:transition spd="slow">
         <p:fade/>
       </p:transition>
@@ -25668,13 +25790,13 @@
   <p:clrMapOvr>
     <a:masterClrMapping/>
   </p:clrMapOvr>
-  <mc:AlternateContent xmlns:mc="http://schemas.openxmlformats.org/markup-compatibility/2006">
-    <mc:Choice xmlns:p159="http://schemas.microsoft.com/office/powerpoint/2015/09/main" Requires="p159">
+  <mc:AlternateContent xmlns:mc="http://schemas.openxmlformats.org/markup-compatibility/2006" xmlns:p159="http://schemas.microsoft.com/office/powerpoint/2015/09/main">
+    <mc:Choice Requires="p159">
       <p:transition xmlns:p14="http://schemas.microsoft.com/office/powerpoint/2010/main" spd="slow" p14:dur="2000">
         <p159:morph option="byObject"/>
       </p:transition>
     </mc:Choice>
-    <mc:Fallback>
+    <mc:Fallback xmlns="">
       <p:transition spd="slow">
         <p:fade/>
       </p:transition>
@@ -26759,13 +26881,13 @@
   <p:clrMapOvr>
     <a:masterClrMapping/>
   </p:clrMapOvr>
-  <mc:AlternateContent xmlns:mc="http://schemas.openxmlformats.org/markup-compatibility/2006">
-    <mc:Choice xmlns:p159="http://schemas.microsoft.com/office/powerpoint/2015/09/main" Requires="p159">
+  <mc:AlternateContent xmlns:mc="http://schemas.openxmlformats.org/markup-compatibility/2006" xmlns:p159="http://schemas.microsoft.com/office/powerpoint/2015/09/main">
+    <mc:Choice Requires="p159">
       <p:transition xmlns:p14="http://schemas.microsoft.com/office/powerpoint/2010/main" spd="slow" p14:dur="2000">
         <p159:morph option="byObject"/>
       </p:transition>
     </mc:Choice>
-    <mc:Fallback>
+    <mc:Fallback xmlns="">
       <p:transition spd="slow">
         <p:fade/>
       </p:transition>
@@ -28145,13 +28267,13 @@
   <p:clrMapOvr>
     <a:masterClrMapping/>
   </p:clrMapOvr>
-  <mc:AlternateContent xmlns:mc="http://schemas.openxmlformats.org/markup-compatibility/2006">
-    <mc:Choice xmlns:p159="http://schemas.microsoft.com/office/powerpoint/2015/09/main" Requires="p159">
+  <mc:AlternateContent xmlns:mc="http://schemas.openxmlformats.org/markup-compatibility/2006" xmlns:p159="http://schemas.microsoft.com/office/powerpoint/2015/09/main">
+    <mc:Choice Requires="p159">
       <p:transition xmlns:p14="http://schemas.microsoft.com/office/powerpoint/2010/main" spd="slow" p14:dur="2000">
         <p159:morph option="byObject"/>
       </p:transition>
     </mc:Choice>
-    <mc:Fallback>
+    <mc:Fallback xmlns="">
       <p:transition spd="slow">
         <p:fade/>
       </p:transition>

</xml_diff>

<commit_message>
small changes to architecture + presentation
</commit_message>
<xml_diff>
--- a/Zwischen-Präsentation.pptx
+++ b/Zwischen-Präsentation.pptx
@@ -12481,7 +12481,7 @@
           <a:p>
             <a:fld id="{290CDF47-B23A-4CC5-A56C-0A86BE245ADB}" type="datetimeFigureOut">
               <a:rPr lang="de-DE" smtClean="0"/>
-              <a:t>12.06.2024</a:t>
+              <a:t>13.06.2024</a:t>
             </a:fld>
             <a:endParaRPr lang="de-DE"/>
           </a:p>
@@ -14023,7 +14023,7 @@
           <a:p>
             <a:fld id="{CE800001-F7EE-47B6-A215-BCA6054410BA}" type="datetimeFigureOut">
               <a:rPr lang="de-DE" smtClean="0"/>
-              <a:t>12.06.2024</a:t>
+              <a:t>13.06.2024</a:t>
             </a:fld>
             <a:endParaRPr lang="de-DE"/>
           </a:p>
@@ -14221,7 +14221,7 @@
           <a:p>
             <a:fld id="{CE800001-F7EE-47B6-A215-BCA6054410BA}" type="datetimeFigureOut">
               <a:rPr lang="de-DE" smtClean="0"/>
-              <a:t>12.06.2024</a:t>
+              <a:t>13.06.2024</a:t>
             </a:fld>
             <a:endParaRPr lang="de-DE"/>
           </a:p>
@@ -14429,7 +14429,7 @@
           <a:p>
             <a:fld id="{CE800001-F7EE-47B6-A215-BCA6054410BA}" type="datetimeFigureOut">
               <a:rPr lang="de-DE" smtClean="0"/>
-              <a:t>12.06.2024</a:t>
+              <a:t>13.06.2024</a:t>
             </a:fld>
             <a:endParaRPr lang="de-DE"/>
           </a:p>
@@ -14627,7 +14627,7 @@
           <a:p>
             <a:fld id="{CE800001-F7EE-47B6-A215-BCA6054410BA}" type="datetimeFigureOut">
               <a:rPr lang="de-DE" smtClean="0"/>
-              <a:t>12.06.2024</a:t>
+              <a:t>13.06.2024</a:t>
             </a:fld>
             <a:endParaRPr lang="de-DE"/>
           </a:p>
@@ -14902,7 +14902,7 @@
           <a:p>
             <a:fld id="{CE800001-F7EE-47B6-A215-BCA6054410BA}" type="datetimeFigureOut">
               <a:rPr lang="de-DE" smtClean="0"/>
-              <a:t>12.06.2024</a:t>
+              <a:t>13.06.2024</a:t>
             </a:fld>
             <a:endParaRPr lang="de-DE"/>
           </a:p>
@@ -15167,7 +15167,7 @@
           <a:p>
             <a:fld id="{CE800001-F7EE-47B6-A215-BCA6054410BA}" type="datetimeFigureOut">
               <a:rPr lang="de-DE" smtClean="0"/>
-              <a:t>12.06.2024</a:t>
+              <a:t>13.06.2024</a:t>
             </a:fld>
             <a:endParaRPr lang="de-DE"/>
           </a:p>
@@ -15579,7 +15579,7 @@
           <a:p>
             <a:fld id="{CE800001-F7EE-47B6-A215-BCA6054410BA}" type="datetimeFigureOut">
               <a:rPr lang="de-DE" smtClean="0"/>
-              <a:t>12.06.2024</a:t>
+              <a:t>13.06.2024</a:t>
             </a:fld>
             <a:endParaRPr lang="de-DE"/>
           </a:p>
@@ -15720,7 +15720,7 @@
           <a:p>
             <a:fld id="{CE800001-F7EE-47B6-A215-BCA6054410BA}" type="datetimeFigureOut">
               <a:rPr lang="de-DE" smtClean="0"/>
-              <a:t>12.06.2024</a:t>
+              <a:t>13.06.2024</a:t>
             </a:fld>
             <a:endParaRPr lang="de-DE"/>
           </a:p>
@@ -15833,7 +15833,7 @@
           <a:p>
             <a:fld id="{CE800001-F7EE-47B6-A215-BCA6054410BA}" type="datetimeFigureOut">
               <a:rPr lang="de-DE" smtClean="0"/>
-              <a:t>12.06.2024</a:t>
+              <a:t>13.06.2024</a:t>
             </a:fld>
             <a:endParaRPr lang="de-DE"/>
           </a:p>
@@ -16144,7 +16144,7 @@
           <a:p>
             <a:fld id="{CE800001-F7EE-47B6-A215-BCA6054410BA}" type="datetimeFigureOut">
               <a:rPr lang="de-DE" smtClean="0"/>
-              <a:t>12.06.2024</a:t>
+              <a:t>13.06.2024</a:t>
             </a:fld>
             <a:endParaRPr lang="de-DE"/>
           </a:p>
@@ -16432,7 +16432,7 @@
           <a:p>
             <a:fld id="{CE800001-F7EE-47B6-A215-BCA6054410BA}" type="datetimeFigureOut">
               <a:rPr lang="de-DE" smtClean="0"/>
-              <a:t>12.06.2024</a:t>
+              <a:t>13.06.2024</a:t>
             </a:fld>
             <a:endParaRPr lang="de-DE"/>
           </a:p>
@@ -16673,7 +16673,7 @@
           <a:p>
             <a:fld id="{CE800001-F7EE-47B6-A215-BCA6054410BA}" type="datetimeFigureOut">
               <a:rPr lang="de-DE" smtClean="0"/>
-              <a:t>12.06.2024</a:t>
+              <a:t>13.06.2024</a:t>
             </a:fld>
             <a:endParaRPr lang="de-DE"/>
           </a:p>
@@ -19357,10 +19357,10 @@
       </p:sp>
       <p:pic>
         <p:nvPicPr>
-          <p:cNvPr id="22" name="Grafik 21" descr="Ein Bild, das Text, Diagramm, Plan, parallel enthält.&#10;&#10;Automatisch generierte Beschreibung">
+          <p:cNvPr id="5" name="Grafik 4" descr="Ein Bild, das Text, Diagramm, Plan, parallel enthält.&#10;&#10;Automatisch generierte Beschreibung">
             <a:extLst>
               <a:ext uri="{FF2B5EF4-FFF2-40B4-BE49-F238E27FC236}">
-                <a16:creationId xmlns:a16="http://schemas.microsoft.com/office/drawing/2014/main" id="{0EAEC8E0-FE54-2A3B-AB31-8F9FFEE21977}"/>
+                <a16:creationId xmlns:a16="http://schemas.microsoft.com/office/drawing/2014/main" id="{B6D44A77-3EAD-6C1F-3D2E-01507B647944}"/>
               </a:ext>
             </a:extLst>
           </p:cNvPr>
@@ -19393,8 +19393,8 @@
         </p:blipFill>
         <p:spPr>
           <a:xfrm>
-            <a:off x="2453953" y="1068031"/>
-            <a:ext cx="7051997" cy="5262796"/>
+            <a:off x="1741432" y="836620"/>
+            <a:ext cx="7760377" cy="5793537"/>
           </a:xfrm>
           <a:prstGeom prst="rect">
             <a:avLst/>
@@ -19948,10 +19948,10 @@
       </p:grpSpPr>
       <p:pic>
         <p:nvPicPr>
-          <p:cNvPr id="3" name="Grafik 2" descr="Ein Bild, das Text, Diagramm, Plan, technische Zeichnung enthält.&#10;&#10;Automatisch generierte Beschreibung">
+          <p:cNvPr id="13" name="Grafik 12" descr="Ein Bild, das Schrift, Screenshot, Grafiken, Text enthält.&#10;&#10;Automatisch generierte Beschreibung">
             <a:extLst>
               <a:ext uri="{FF2B5EF4-FFF2-40B4-BE49-F238E27FC236}">
-                <a16:creationId xmlns:a16="http://schemas.microsoft.com/office/drawing/2014/main" id="{3A55BC73-3F11-C0EB-4690-0BB4A3272FEB}"/>
+                <a16:creationId xmlns:a16="http://schemas.microsoft.com/office/drawing/2014/main" id="{CEFD0BAA-CD64-1295-D48F-2145AC9083DE}"/>
               </a:ext>
             </a:extLst>
           </p:cNvPr>
@@ -19962,6 +19962,42 @@
         </p:nvPicPr>
         <p:blipFill>
           <a:blip r:embed="rId3">
+            <a:extLst>
+              <a:ext uri="{28A0092B-C50C-407E-A947-70E740481C1C}">
+                <a14:useLocalDpi xmlns:a14="http://schemas.microsoft.com/office/drawing/2010/main" val="0"/>
+              </a:ext>
+            </a:extLst>
+          </a:blip>
+          <a:stretch>
+            <a:fillRect/>
+          </a:stretch>
+        </p:blipFill>
+        <p:spPr>
+          <a:xfrm>
+            <a:off x="53340" y="6121261"/>
+            <a:ext cx="2072640" cy="666699"/>
+          </a:xfrm>
+          <a:prstGeom prst="rect">
+            <a:avLst/>
+          </a:prstGeom>
+        </p:spPr>
+      </p:pic>
+      <p:pic>
+        <p:nvPicPr>
+          <p:cNvPr id="4" name="Grafik 3" descr="Ein Bild, das Text, Diagramm, Plan, technische Zeichnung enthält.&#10;&#10;Automatisch generierte Beschreibung">
+            <a:extLst>
+              <a:ext uri="{FF2B5EF4-FFF2-40B4-BE49-F238E27FC236}">
+                <a16:creationId xmlns:a16="http://schemas.microsoft.com/office/drawing/2014/main" id="{22C7F2D3-BB13-62DF-741E-DA45371E8C23}"/>
+              </a:ext>
+            </a:extLst>
+          </p:cNvPr>
+          <p:cNvPicPr>
+            <a:picLocks noChangeAspect="1"/>
+          </p:cNvPicPr>
+          <p:nvPr/>
+        </p:nvPicPr>
+        <p:blipFill>
+          <a:blip r:embed="rId4">
             <a:clrChange>
               <a:clrFrom>
                 <a:srgbClr val="FFFFFF"/>
@@ -19984,44 +20020,8 @@
         </p:blipFill>
         <p:spPr>
           <a:xfrm>
-            <a:off x="832560" y="380294"/>
-            <a:ext cx="10051340" cy="6211005"/>
-          </a:xfrm>
-          <a:prstGeom prst="rect">
-            <a:avLst/>
-          </a:prstGeom>
-        </p:spPr>
-      </p:pic>
-      <p:pic>
-        <p:nvPicPr>
-          <p:cNvPr id="13" name="Grafik 12" descr="Ein Bild, das Schrift, Screenshot, Grafiken, Text enthält.&#10;&#10;Automatisch generierte Beschreibung">
-            <a:extLst>
-              <a:ext uri="{FF2B5EF4-FFF2-40B4-BE49-F238E27FC236}">
-                <a16:creationId xmlns:a16="http://schemas.microsoft.com/office/drawing/2014/main" id="{CEFD0BAA-CD64-1295-D48F-2145AC9083DE}"/>
-              </a:ext>
-            </a:extLst>
-          </p:cNvPr>
-          <p:cNvPicPr>
-            <a:picLocks noChangeAspect="1"/>
-          </p:cNvPicPr>
-          <p:nvPr/>
-        </p:nvPicPr>
-        <p:blipFill>
-          <a:blip r:embed="rId4">
-            <a:extLst>
-              <a:ext uri="{28A0092B-C50C-407E-A947-70E740481C1C}">
-                <a14:useLocalDpi xmlns:a14="http://schemas.microsoft.com/office/drawing/2010/main" val="0"/>
-              </a:ext>
-            </a:extLst>
-          </a:blip>
-          <a:stretch>
-            <a:fillRect/>
-          </a:stretch>
-        </p:blipFill>
-        <p:spPr>
-          <a:xfrm>
-            <a:off x="53340" y="6121261"/>
-            <a:ext cx="2072640" cy="666699"/>
+            <a:off x="731197" y="338628"/>
+            <a:ext cx="10241604" cy="6323927"/>
           </a:xfrm>
           <a:prstGeom prst="rect">
             <a:avLst/>

</xml_diff>

<commit_message>
implement feedback from presentation + add comment to fix hausnummer bug
</commit_message>
<xml_diff>
--- a/Zwischen-Präsentation.pptx
+++ b/Zwischen-Präsentation.pptx
@@ -12481,7 +12481,7 @@
           <a:p>
             <a:fld id="{290CDF47-B23A-4CC5-A56C-0A86BE245ADB}" type="datetimeFigureOut">
               <a:rPr lang="de-DE" smtClean="0"/>
-              <a:t>13.06.2024</a:t>
+              <a:t>14.06.2024</a:t>
             </a:fld>
             <a:endParaRPr lang="de-DE"/>
           </a:p>
@@ -14023,7 +14023,7 @@
           <a:p>
             <a:fld id="{CE800001-F7EE-47B6-A215-BCA6054410BA}" type="datetimeFigureOut">
               <a:rPr lang="de-DE" smtClean="0"/>
-              <a:t>13.06.2024</a:t>
+              <a:t>14.06.2024</a:t>
             </a:fld>
             <a:endParaRPr lang="de-DE"/>
           </a:p>
@@ -14221,7 +14221,7 @@
           <a:p>
             <a:fld id="{CE800001-F7EE-47B6-A215-BCA6054410BA}" type="datetimeFigureOut">
               <a:rPr lang="de-DE" smtClean="0"/>
-              <a:t>13.06.2024</a:t>
+              <a:t>14.06.2024</a:t>
             </a:fld>
             <a:endParaRPr lang="de-DE"/>
           </a:p>
@@ -14429,7 +14429,7 @@
           <a:p>
             <a:fld id="{CE800001-F7EE-47B6-A215-BCA6054410BA}" type="datetimeFigureOut">
               <a:rPr lang="de-DE" smtClean="0"/>
-              <a:t>13.06.2024</a:t>
+              <a:t>14.06.2024</a:t>
             </a:fld>
             <a:endParaRPr lang="de-DE"/>
           </a:p>
@@ -14627,7 +14627,7 @@
           <a:p>
             <a:fld id="{CE800001-F7EE-47B6-A215-BCA6054410BA}" type="datetimeFigureOut">
               <a:rPr lang="de-DE" smtClean="0"/>
-              <a:t>13.06.2024</a:t>
+              <a:t>14.06.2024</a:t>
             </a:fld>
             <a:endParaRPr lang="de-DE"/>
           </a:p>
@@ -14902,7 +14902,7 @@
           <a:p>
             <a:fld id="{CE800001-F7EE-47B6-A215-BCA6054410BA}" type="datetimeFigureOut">
               <a:rPr lang="de-DE" smtClean="0"/>
-              <a:t>13.06.2024</a:t>
+              <a:t>14.06.2024</a:t>
             </a:fld>
             <a:endParaRPr lang="de-DE"/>
           </a:p>
@@ -15167,7 +15167,7 @@
           <a:p>
             <a:fld id="{CE800001-F7EE-47B6-A215-BCA6054410BA}" type="datetimeFigureOut">
               <a:rPr lang="de-DE" smtClean="0"/>
-              <a:t>13.06.2024</a:t>
+              <a:t>14.06.2024</a:t>
             </a:fld>
             <a:endParaRPr lang="de-DE"/>
           </a:p>
@@ -15579,7 +15579,7 @@
           <a:p>
             <a:fld id="{CE800001-F7EE-47B6-A215-BCA6054410BA}" type="datetimeFigureOut">
               <a:rPr lang="de-DE" smtClean="0"/>
-              <a:t>13.06.2024</a:t>
+              <a:t>14.06.2024</a:t>
             </a:fld>
             <a:endParaRPr lang="de-DE"/>
           </a:p>
@@ -15720,7 +15720,7 @@
           <a:p>
             <a:fld id="{CE800001-F7EE-47B6-A215-BCA6054410BA}" type="datetimeFigureOut">
               <a:rPr lang="de-DE" smtClean="0"/>
-              <a:t>13.06.2024</a:t>
+              <a:t>14.06.2024</a:t>
             </a:fld>
             <a:endParaRPr lang="de-DE"/>
           </a:p>
@@ -15833,7 +15833,7 @@
           <a:p>
             <a:fld id="{CE800001-F7EE-47B6-A215-BCA6054410BA}" type="datetimeFigureOut">
               <a:rPr lang="de-DE" smtClean="0"/>
-              <a:t>13.06.2024</a:t>
+              <a:t>14.06.2024</a:t>
             </a:fld>
             <a:endParaRPr lang="de-DE"/>
           </a:p>
@@ -16144,7 +16144,7 @@
           <a:p>
             <a:fld id="{CE800001-F7EE-47B6-A215-BCA6054410BA}" type="datetimeFigureOut">
               <a:rPr lang="de-DE" smtClean="0"/>
-              <a:t>13.06.2024</a:t>
+              <a:t>14.06.2024</a:t>
             </a:fld>
             <a:endParaRPr lang="de-DE"/>
           </a:p>
@@ -16432,7 +16432,7 @@
           <a:p>
             <a:fld id="{CE800001-F7EE-47B6-A215-BCA6054410BA}" type="datetimeFigureOut">
               <a:rPr lang="de-DE" smtClean="0"/>
-              <a:t>13.06.2024</a:t>
+              <a:t>14.06.2024</a:t>
             </a:fld>
             <a:endParaRPr lang="de-DE"/>
           </a:p>
@@ -16673,7 +16673,7 @@
           <a:p>
             <a:fld id="{CE800001-F7EE-47B6-A215-BCA6054410BA}" type="datetimeFigureOut">
               <a:rPr lang="de-DE" smtClean="0"/>
-              <a:t>13.06.2024</a:t>
+              <a:t>14.06.2024</a:t>
             </a:fld>
             <a:endParaRPr lang="de-DE"/>
           </a:p>
@@ -18732,8 +18732,8 @@
         </p:nvSpPr>
         <p:spPr>
           <a:xfrm>
-            <a:off x="1656323" y="2438941"/>
-            <a:ext cx="8879354" cy="769441"/>
+            <a:off x="1462360" y="2438941"/>
+            <a:ext cx="9267281" cy="769441"/>
           </a:xfrm>
           <a:prstGeom prst="rect">
             <a:avLst/>
@@ -18766,7 +18766,7 @@
                 </a:solidFill>
                 <a:latin typeface="Montserrat" panose="02000505000000020004" pitchFamily="2" charset="0"/>
               </a:rPr>
-              <a:t>Verwalten einer Helferliste</a:t>
+              <a:t>Verwaltung einer Helferliste</a:t>
             </a:r>
             <a:r>
               <a:rPr lang="de-DE" sz="4400" b="1" dirty="0">
@@ -19457,8 +19457,8 @@
         </p:nvSpPr>
         <p:spPr>
           <a:xfrm>
-            <a:off x="1656323" y="2438941"/>
-            <a:ext cx="8879354" cy="769441"/>
+            <a:off x="1462360" y="2438941"/>
+            <a:ext cx="9267281" cy="769441"/>
           </a:xfrm>
           <a:prstGeom prst="rect">
             <a:avLst/>
@@ -19491,7 +19491,7 @@
                 </a:solidFill>
                 <a:latin typeface="Montserrat" panose="02000505000000020004" pitchFamily="2" charset="0"/>
               </a:rPr>
-              <a:t>Verwalten einer Helferliste</a:t>
+              <a:t>Verwaltung einer Helferliste</a:t>
             </a:r>
             <a:r>
               <a:rPr lang="de-DE" sz="4400" b="1" dirty="0">
@@ -20084,8 +20084,8 @@
         </p:nvSpPr>
         <p:spPr>
           <a:xfrm>
-            <a:off x="1656323" y="2438941"/>
-            <a:ext cx="8879354" cy="769441"/>
+            <a:off x="1462360" y="2438941"/>
+            <a:ext cx="9267281" cy="769441"/>
           </a:xfrm>
           <a:prstGeom prst="rect">
             <a:avLst/>
@@ -20118,7 +20118,7 @@
                 </a:solidFill>
                 <a:latin typeface="Montserrat" panose="02000505000000020004" pitchFamily="2" charset="0"/>
               </a:rPr>
-              <a:t>Verwalten einer Helferliste</a:t>
+              <a:t>Verwaltung einer Helferliste</a:t>
             </a:r>
             <a:r>
               <a:rPr lang="de-DE" sz="4400" b="1" dirty="0">
@@ -22142,8 +22142,8 @@
         </p:nvSpPr>
         <p:spPr>
           <a:xfrm>
-            <a:off x="2169284" y="3899954"/>
-            <a:ext cx="7853432" cy="1200329"/>
+            <a:off x="1462360" y="3899954"/>
+            <a:ext cx="9267281" cy="1200329"/>
           </a:xfrm>
           <a:prstGeom prst="rect">
             <a:avLst/>
@@ -22160,11 +22160,35 @@
             <a:r>
               <a:rPr lang="de-DE" sz="4400" b="1" dirty="0">
                 <a:solidFill>
+                  <a:schemeClr val="accent1">
+                    <a:lumMod val="40000"/>
+                    <a:lumOff val="60000"/>
+                  </a:schemeClr>
+                </a:solidFill>
+                <a:latin typeface="Montserrat" panose="02000505000000020004" pitchFamily="2" charset="0"/>
+              </a:rPr>
+              <a:t>&lt;</a:t>
+            </a:r>
+            <a:r>
+              <a:rPr lang="de-DE" sz="4400" b="1" dirty="0">
+                <a:solidFill>
                   <a:srgbClr val="2667FF"/>
                 </a:solidFill>
                 <a:latin typeface="Montserrat" panose="02000505000000020004" pitchFamily="2" charset="0"/>
               </a:rPr>
-              <a:t>Verwalten einer Helferliste</a:t>
+              <a:t>Verwaltung einer Helferliste</a:t>
+            </a:r>
+            <a:r>
+              <a:rPr lang="de-DE" sz="4400" b="1" dirty="0">
+                <a:solidFill>
+                  <a:schemeClr val="accent1">
+                    <a:lumMod val="40000"/>
+                    <a:lumOff val="60000"/>
+                  </a:schemeClr>
+                </a:solidFill>
+                <a:latin typeface="Montserrat" panose="02000505000000020004" pitchFamily="2" charset="0"/>
+              </a:rPr>
+              <a:t>/&gt;</a:t>
             </a:r>
           </a:p>
           <a:p>
@@ -23054,8 +23078,8 @@
         </p:nvSpPr>
         <p:spPr>
           <a:xfrm>
-            <a:off x="1656323" y="2438941"/>
-            <a:ext cx="8879354" cy="769441"/>
+            <a:off x="1462360" y="2438941"/>
+            <a:ext cx="9267281" cy="769441"/>
           </a:xfrm>
           <a:prstGeom prst="rect">
             <a:avLst/>
@@ -23088,7 +23112,7 @@
                 </a:solidFill>
                 <a:latin typeface="Montserrat" panose="02000505000000020004" pitchFamily="2" charset="0"/>
               </a:rPr>
-              <a:t>Verwalten einer Helferliste</a:t>
+              <a:t>Verwaltung einer Helferliste</a:t>
             </a:r>
             <a:r>
               <a:rPr lang="de-DE" sz="4400" b="1" dirty="0">

</xml_diff>